<commit_message>
Add updated final files
</commit_message>
<xml_diff>
--- a/Tanzanian_Water_Wells_Presentation.pptx
+++ b/Tanzanian_Water_Wells_Presentation.pptx
@@ -18,7 +18,7 @@
     <p:sldId id="268" r:id="rId12"/>
     <p:sldId id="270" r:id="rId13"/>
     <p:sldId id="264" r:id="rId14"/>
-    <p:sldId id="265" r:id="rId15"/>
+    <p:sldId id="271" r:id="rId15"/>
   </p:sldIdLst>
   <p:sldSz cx="12192000" cy="6858000"/>
   <p:notesSz cx="6858000" cy="9144000"/>
@@ -21249,7 +21249,7 @@
           <a:p>
             <a:r>
               <a:rPr lang="en-US" cap="none" dirty="0"/>
-              <a:t>Features</a:t>
+              <a:t>Prediction – using optimal models</a:t>
             </a:r>
             <a:endParaRPr lang="en-US" dirty="0"/>
           </a:p>
@@ -21271,16 +21271,15 @@
             <p:ph idx="1"/>
           </p:nvPr>
         </p:nvSpPr>
-        <p:spPr/>
+        <p:spPr>
+          <a:xfrm>
+            <a:off x="1024128" y="2286000"/>
+            <a:ext cx="3995133" cy="3986784"/>
+          </a:xfrm>
+        </p:spPr>
         <p:txBody>
           <a:bodyPr/>
           <a:lstStyle/>
-          <a:p>
-            <a:r>
-              <a:rPr lang="en-US" dirty="0"/>
-              <a:t>significant features for determining wells functionality </a:t>
-            </a:r>
-          </a:p>
           <a:p>
             <a:pPr marL="168275" indent="-168275">
               <a:buFont typeface="Wingdings" panose="05000000000000000000" pitchFamily="2" charset="2"/>
@@ -21293,6 +21292,18 @@
           </a:p>
           <a:p>
             <a:endParaRPr lang="en-US" dirty="0"/>
+          </a:p>
+          <a:p>
+            <a:r>
+              <a:rPr lang="en-US" dirty="0"/>
+              <a:t>NB</a:t>
+            </a:r>
+          </a:p>
+          <a:p>
+            <a:r>
+              <a:rPr lang="en-US" dirty="0"/>
+              <a:t>Predicted datasets are saved in dataset for review</a:t>
+            </a:r>
           </a:p>
         </p:txBody>
       </p:sp>
@@ -21356,6 +21367,36 @@
           </a:prstGeom>
         </p:spPr>
       </p:pic>
+      <p:pic>
+        <p:nvPicPr>
+          <p:cNvPr id="6" name="Picture 5">
+            <a:extLst>
+              <a:ext uri="{FF2B5EF4-FFF2-40B4-BE49-F238E27FC236}">
+                <a16:creationId xmlns:a16="http://schemas.microsoft.com/office/drawing/2014/main" id="{600248A7-59CB-4A1A-B9DD-8CBA19423772}"/>
+              </a:ext>
+            </a:extLst>
+          </p:cNvPr>
+          <p:cNvPicPr>
+            <a:picLocks noChangeAspect="1"/>
+          </p:cNvPicPr>
+          <p:nvPr/>
+        </p:nvPicPr>
+        <p:blipFill>
+          <a:blip r:embed="rId4"/>
+          <a:stretch>
+            <a:fillRect/>
+          </a:stretch>
+        </p:blipFill>
+        <p:spPr>
+          <a:xfrm>
+            <a:off x="5256393" y="2166731"/>
+            <a:ext cx="6048992" cy="3816626"/>
+          </a:xfrm>
+          <a:prstGeom prst="rect">
+            <a:avLst/>
+          </a:prstGeom>
+        </p:spPr>
+      </p:pic>
     </p:spTree>
     <p:extLst>
       <p:ext uri="{BB962C8B-B14F-4D97-AF65-F5344CB8AC3E}">
@@ -21409,7 +21450,7 @@
           <a:p>
             <a:r>
               <a:rPr lang="en-US" cap="none" dirty="0"/>
-              <a:t>Conclusions</a:t>
+              <a:t>Conclusions and Recommendations</a:t>
             </a:r>
           </a:p>
         </p:txBody>
@@ -21437,7 +21478,44 @@
           </a:bodyPr>
           <a:lstStyle/>
           <a:p>
-            <a:endParaRPr lang="en-US" dirty="0"/>
+            <a:pPr marL="457200" indent="-457200">
+              <a:buFont typeface="+mj-lt"/>
+              <a:buAutoNum type="arabicPeriod"/>
+            </a:pPr>
+            <a:r>
+              <a:rPr lang="en-US" dirty="0"/>
+              <a:t>To determine Water Well (Shallow well and boreholes) by functionality and non-functionality, explore use of tuned Decision tree model. </a:t>
+            </a:r>
+          </a:p>
+          <a:p>
+            <a:pPr marL="457200" indent="-457200">
+              <a:buFont typeface="+mj-lt"/>
+              <a:buAutoNum type="arabicPeriod"/>
+            </a:pPr>
+            <a:r>
+              <a:rPr lang="en-US" dirty="0"/>
+              <a:t>To determine water well (Shallow well and boreholes) by all the three status groups, explore use of random forest.</a:t>
+            </a:r>
+          </a:p>
+          <a:p>
+            <a:pPr marL="457200" indent="-457200">
+              <a:buFont typeface="+mj-lt"/>
+              <a:buAutoNum type="arabicPeriod"/>
+            </a:pPr>
+            <a:r>
+              <a:rPr lang="en-US" dirty="0"/>
+              <a:t>The most important features in determining effective predictive model were elevation, construction year, population using the source, water availability and extraction methods, financial commitments and maintenance responsibility.</a:t>
+            </a:r>
+          </a:p>
+          <a:p>
+            <a:pPr marL="457200" indent="-457200">
+              <a:buFont typeface="+mj-lt"/>
+              <a:buAutoNum type="arabicPeriod"/>
+            </a:pPr>
+            <a:r>
+              <a:rPr lang="en-US" dirty="0"/>
+              <a:t>To further improve of predictive models, take next steps to explore fine tuning approaches of the optimal model - Random Forest.</a:t>
+            </a:r>
           </a:p>
         </p:txBody>
       </p:sp>
@@ -21533,122 +21611,44 @@
       </p:grpSpPr>
       <p:sp>
         <p:nvSpPr>
-          <p:cNvPr id="2" name="Title 1">
+          <p:cNvPr id="2" name="TextBox 1">
             <a:extLst>
               <a:ext uri="{FF2B5EF4-FFF2-40B4-BE49-F238E27FC236}">
-                <a16:creationId xmlns:a16="http://schemas.microsoft.com/office/drawing/2014/main" id="{7D959A0B-8E3B-46CD-A2B9-2471E549DF27}"/>
+                <a16:creationId xmlns:a16="http://schemas.microsoft.com/office/drawing/2014/main" id="{C77ABB7E-8D43-4CFF-A557-F9A4A39AE261}"/>
               </a:ext>
             </a:extLst>
           </p:cNvPr>
-          <p:cNvSpPr>
-            <a:spLocks noGrp="1"/>
-          </p:cNvSpPr>
-          <p:nvPr>
-            <p:ph type="title"/>
-          </p:nvPr>
+          <p:cNvSpPr txBox="1"/>
+          <p:nvPr/>
         </p:nvSpPr>
-        <p:spPr/>
-        <p:txBody>
-          <a:bodyPr/>
-          <a:lstStyle/>
-          <a:p>
-            <a:r>
-              <a:rPr lang="en-US" cap="none" dirty="0"/>
-              <a:t>Recommendations</a:t>
-            </a:r>
-            <a:endParaRPr lang="en-US" dirty="0"/>
-          </a:p>
-        </p:txBody>
-      </p:sp>
-      <p:sp>
-        <p:nvSpPr>
-          <p:cNvPr id="3" name="Content Placeholder 2">
-            <a:extLst>
-              <a:ext uri="{FF2B5EF4-FFF2-40B4-BE49-F238E27FC236}">
-                <a16:creationId xmlns:a16="http://schemas.microsoft.com/office/drawing/2014/main" id="{BAE4ECFD-06A0-4A5E-913A-3A11362E6D6D}"/>
-              </a:ext>
-            </a:extLst>
-          </p:cNvPr>
-          <p:cNvSpPr>
-            <a:spLocks noGrp="1"/>
-          </p:cNvSpPr>
-          <p:nvPr>
-            <p:ph idx="1"/>
-          </p:nvPr>
-        </p:nvSpPr>
-        <p:spPr/>
-        <p:txBody>
-          <a:bodyPr/>
-          <a:lstStyle/>
-          <a:p>
-            <a:endParaRPr lang="en-US"/>
-          </a:p>
-        </p:txBody>
-      </p:sp>
-      <p:pic>
-        <p:nvPicPr>
-          <p:cNvPr id="4" name="Picture 3">
-            <a:extLst>
-              <a:ext uri="{FF2B5EF4-FFF2-40B4-BE49-F238E27FC236}">
-                <a16:creationId xmlns:a16="http://schemas.microsoft.com/office/drawing/2014/main" id="{22AF3984-1144-4078-B4F6-8A9DCF20833C}"/>
-              </a:ext>
-            </a:extLst>
-          </p:cNvPr>
-          <p:cNvPicPr>
-            <a:picLocks noChangeAspect="1"/>
-          </p:cNvPicPr>
-          <p:nvPr/>
-        </p:nvPicPr>
-        <p:blipFill>
-          <a:blip r:embed="rId2"/>
-          <a:stretch>
-            <a:fillRect/>
-          </a:stretch>
-        </p:blipFill>
         <p:spPr>
           <a:xfrm>
-            <a:off x="10916765" y="0"/>
-            <a:ext cx="1275235" cy="1371600"/>
+            <a:off x="2395331" y="2594113"/>
+            <a:ext cx="7981121" cy="1446550"/>
           </a:xfrm>
           <a:prstGeom prst="rect">
             <a:avLst/>
           </a:prstGeom>
+          <a:noFill/>
         </p:spPr>
-      </p:pic>
-      <p:pic>
-        <p:nvPicPr>
-          <p:cNvPr id="5" name="Picture 4">
-            <a:extLst>
-              <a:ext uri="{FF2B5EF4-FFF2-40B4-BE49-F238E27FC236}">
-                <a16:creationId xmlns:a16="http://schemas.microsoft.com/office/drawing/2014/main" id="{E7F33EA1-B031-48E6-A6EC-EC77334DF83F}"/>
-              </a:ext>
-            </a:extLst>
-          </p:cNvPr>
-          <p:cNvPicPr>
-            <a:picLocks noChangeAspect="1"/>
-          </p:cNvPicPr>
-          <p:nvPr/>
-        </p:nvPicPr>
-        <p:blipFill>
-          <a:blip r:embed="rId3"/>
-          <a:stretch>
-            <a:fillRect/>
-          </a:stretch>
-        </p:blipFill>
-        <p:spPr>
-          <a:xfrm>
-            <a:off x="9783704" y="0"/>
-            <a:ext cx="1133061" cy="1371600"/>
-          </a:xfrm>
-          <a:prstGeom prst="rect">
-            <a:avLst/>
-          </a:prstGeom>
-        </p:spPr>
-      </p:pic>
+        <p:txBody>
+          <a:bodyPr wrap="square" rtlCol="0">
+            <a:spAutoFit/>
+          </a:bodyPr>
+          <a:lstStyle/>
+          <a:p>
+            <a:pPr algn="ctr"/>
+            <a:r>
+              <a:rPr lang="en-US" sz="8800" dirty="0"/>
+              <a:t>Questions?</a:t>
+            </a:r>
+          </a:p>
+        </p:txBody>
+      </p:sp>
     </p:spTree>
     <p:extLst>
       <p:ext uri="{BB962C8B-B14F-4D97-AF65-F5344CB8AC3E}">
-        <p14:creationId xmlns:p14="http://schemas.microsoft.com/office/powerpoint/2010/main" val="2833815640"/>
+        <p14:creationId xmlns:p14="http://schemas.microsoft.com/office/powerpoint/2010/main" val="2255413856"/>
       </p:ext>
     </p:extLst>
   </p:cSld>

</xml_diff>